<commit_message>
HTML hardcode & PPT
</commit_message>
<xml_diff>
--- a/pre.pptx
+++ b/pre.pptx
@@ -115,6 +115,11 @@
       </a:defRPr>
     </a:lvl9pPr>
   </p:defaultTextStyle>
+  <p:extLst>
+    <p:ext uri="{EFAFB233-063F-42B5-8137-9DF3F51BA10A}">
+      <p15:sldGuideLst xmlns:p15="http://schemas.microsoft.com/office/powerpoint/2012/main"/>
+    </p:ext>
+  </p:extLst>
 </p:presentation>
 </file>
 
@@ -306,7 +311,7 @@
           <a:p>
             <a:fld id="{753358D1-AD86-4499-A542-C3D167BDE848}" type="datetimeFigureOut">
               <a:rPr lang="en-US" smtClean="0"/>
-              <a:t>2016-11-28</a:t>
+              <a:t>2016-11-29</a:t>
             </a:fld>
             <a:endParaRPr lang="en-US"/>
           </a:p>
@@ -644,7 +649,7 @@
           <a:p>
             <a:fld id="{753358D1-AD86-4499-A542-C3D167BDE848}" type="datetimeFigureOut">
               <a:rPr lang="en-US" smtClean="0"/>
-              <a:t>2016-11-28</a:t>
+              <a:t>2016-11-29</a:t>
             </a:fld>
             <a:endParaRPr lang="en-US"/>
           </a:p>
@@ -1045,7 +1050,7 @@
           <a:p>
             <a:fld id="{753358D1-AD86-4499-A542-C3D167BDE848}" type="datetimeFigureOut">
               <a:rPr lang="en-US" smtClean="0"/>
-              <a:t>2016-11-28</a:t>
+              <a:t>2016-11-29</a:t>
             </a:fld>
             <a:endParaRPr lang="en-US"/>
           </a:p>
@@ -1381,7 +1386,7 @@
           <a:p>
             <a:fld id="{753358D1-AD86-4499-A542-C3D167BDE848}" type="datetimeFigureOut">
               <a:rPr lang="en-US" smtClean="0"/>
-              <a:t>2016-11-28</a:t>
+              <a:t>2016-11-29</a:t>
             </a:fld>
             <a:endParaRPr lang="en-US"/>
           </a:p>
@@ -1701,7 +1706,7 @@
           <a:p>
             <a:fld id="{753358D1-AD86-4499-A542-C3D167BDE848}" type="datetimeFigureOut">
               <a:rPr lang="en-US" smtClean="0"/>
-              <a:t>2016-11-28</a:t>
+              <a:t>2016-11-29</a:t>
             </a:fld>
             <a:endParaRPr lang="en-US"/>
           </a:p>
@@ -2097,7 +2102,7 @@
           <a:p>
             <a:fld id="{753358D1-AD86-4499-A542-C3D167BDE848}" type="datetimeFigureOut">
               <a:rPr lang="en-US" smtClean="0"/>
-              <a:t>2016-11-28</a:t>
+              <a:t>2016-11-29</a:t>
             </a:fld>
             <a:endParaRPr lang="en-US"/>
           </a:p>
@@ -2354,7 +2359,7 @@
           <a:p>
             <a:fld id="{753358D1-AD86-4499-A542-C3D167BDE848}" type="datetimeFigureOut">
               <a:rPr lang="en-US" smtClean="0"/>
-              <a:t>2016-11-28</a:t>
+              <a:t>2016-11-29</a:t>
             </a:fld>
             <a:endParaRPr lang="en-US"/>
           </a:p>
@@ -2616,7 +2621,7 @@
           <a:p>
             <a:fld id="{753358D1-AD86-4499-A542-C3D167BDE848}" type="datetimeFigureOut">
               <a:rPr lang="en-US" smtClean="0"/>
-              <a:t>2016-11-28</a:t>
+              <a:t>2016-11-29</a:t>
             </a:fld>
             <a:endParaRPr lang="en-US"/>
           </a:p>
@@ -2878,7 +2883,7 @@
           <a:p>
             <a:fld id="{753358D1-AD86-4499-A542-C3D167BDE848}" type="datetimeFigureOut">
               <a:rPr lang="en-US" smtClean="0"/>
-              <a:t>2016-11-28</a:t>
+              <a:t>2016-11-29</a:t>
             </a:fld>
             <a:endParaRPr lang="en-US"/>
           </a:p>
@@ -3207,7 +3212,7 @@
           <a:p>
             <a:fld id="{753358D1-AD86-4499-A542-C3D167BDE848}" type="datetimeFigureOut">
               <a:rPr lang="en-US" smtClean="0"/>
-              <a:t>2016-11-28</a:t>
+              <a:t>2016-11-29</a:t>
             </a:fld>
             <a:endParaRPr lang="en-US"/>
           </a:p>
@@ -3530,7 +3535,7 @@
           <a:p>
             <a:fld id="{753358D1-AD86-4499-A542-C3D167BDE848}" type="datetimeFigureOut">
               <a:rPr lang="en-US" smtClean="0"/>
-              <a:t>2016-11-28</a:t>
+              <a:t>2016-11-29</a:t>
             </a:fld>
             <a:endParaRPr lang="en-US"/>
           </a:p>
@@ -3987,7 +3992,7 @@
           <a:p>
             <a:fld id="{753358D1-AD86-4499-A542-C3D167BDE848}" type="datetimeFigureOut">
               <a:rPr lang="en-US" smtClean="0"/>
-              <a:t>2016-11-28</a:t>
+              <a:t>2016-11-29</a:t>
             </a:fld>
             <a:endParaRPr lang="en-US"/>
           </a:p>
@@ -4192,7 +4197,7 @@
           <a:p>
             <a:fld id="{753358D1-AD86-4499-A542-C3D167BDE848}" type="datetimeFigureOut">
               <a:rPr lang="en-US" smtClean="0"/>
-              <a:t>2016-11-28</a:t>
+              <a:t>2016-11-29</a:t>
             </a:fld>
             <a:endParaRPr lang="en-US"/>
           </a:p>
@@ -4369,7 +4374,7 @@
           <a:p>
             <a:fld id="{753358D1-AD86-4499-A542-C3D167BDE848}" type="datetimeFigureOut">
               <a:rPr lang="en-US" smtClean="0"/>
-              <a:t>2016-11-28</a:t>
+              <a:t>2016-11-29</a:t>
             </a:fld>
             <a:endParaRPr lang="en-US"/>
           </a:p>
@@ -4702,7 +4707,7 @@
           <a:p>
             <a:fld id="{753358D1-AD86-4499-A542-C3D167BDE848}" type="datetimeFigureOut">
               <a:rPr lang="en-US" smtClean="0"/>
-              <a:t>2016-11-28</a:t>
+              <a:t>2016-11-29</a:t>
             </a:fld>
             <a:endParaRPr lang="en-US"/>
           </a:p>
@@ -5047,7 +5052,7 @@
           <a:p>
             <a:fld id="{753358D1-AD86-4499-A542-C3D167BDE848}" type="datetimeFigureOut">
               <a:rPr lang="en-US" smtClean="0"/>
-              <a:t>2016-11-28</a:t>
+              <a:t>2016-11-29</a:t>
             </a:fld>
             <a:endParaRPr lang="en-US"/>
           </a:p>
@@ -7164,7 +7169,7 @@
           <a:p>
             <a:fld id="{753358D1-AD86-4499-A542-C3D167BDE848}" type="datetimeFigureOut">
               <a:rPr lang="en-US" smtClean="0"/>
-              <a:t>2016-11-28</a:t>
+              <a:t>2016-11-29</a:t>
             </a:fld>
             <a:endParaRPr lang="en-US"/>
           </a:p>
@@ -7831,28 +7836,36 @@
           </a:p>
         </p:txBody>
       </p:sp>
-      <p:sp>
-        <p:nvSpPr>
-          <p:cNvPr id="3" name="Content Placeholder 2"/>
-          <p:cNvSpPr>
-            <a:spLocks noGrp="1"/>
-          </p:cNvSpPr>
-          <p:nvPr>
-            <p:ph idx="1"/>
-          </p:nvPr>
-        </p:nvSpPr>
-        <p:spPr/>
-        <p:txBody>
-          <a:bodyPr/>
-          <a:lstStyle/>
-          <a:p>
-            <a:r>
-              <a:rPr lang="en-US" i="1" dirty="0"/>
-              <a:t>INSERT SCREENSHOT OF TABLE COST_PER_STATE</a:t>
-            </a:r>
-          </a:p>
-        </p:txBody>
-      </p:sp>
+      <p:pic>
+        <p:nvPicPr>
+          <p:cNvPr id="5" name="Picture 4"/>
+          <p:cNvPicPr>
+            <a:picLocks noChangeAspect="1"/>
+          </p:cNvPicPr>
+          <p:nvPr/>
+        </p:nvPicPr>
+        <p:blipFill>
+          <a:blip r:embed="rId2">
+            <a:extLst>
+              <a:ext uri="{28A0092B-C50C-407E-A947-70E740481C1C}">
+                <a14:useLocalDpi xmlns:a14="http://schemas.microsoft.com/office/drawing/2010/main" val="0"/>
+              </a:ext>
+            </a:extLst>
+          </a:blip>
+          <a:stretch>
+            <a:fillRect/>
+          </a:stretch>
+        </p:blipFill>
+        <p:spPr>
+          <a:xfrm>
+            <a:off x="2688104" y="1388962"/>
+            <a:ext cx="8721327" cy="5191246"/>
+          </a:xfrm>
+          <a:prstGeom prst="rect">
+            <a:avLst/>
+          </a:prstGeom>
+        </p:spPr>
+      </p:pic>
     </p:spTree>
     <p:extLst>
       <p:ext uri="{BB962C8B-B14F-4D97-AF65-F5344CB8AC3E}">
@@ -8596,38 +8609,36 @@
           </a:p>
         </p:txBody>
       </p:sp>
-      <p:sp>
-        <p:nvSpPr>
-          <p:cNvPr id="3" name="Content Placeholder 2"/>
-          <p:cNvSpPr>
-            <a:spLocks noGrp="1"/>
-          </p:cNvSpPr>
-          <p:nvPr>
-            <p:ph idx="1"/>
-          </p:nvPr>
-        </p:nvSpPr>
-        <p:spPr/>
-        <p:txBody>
-          <a:bodyPr/>
-          <a:lstStyle/>
-          <a:p>
-            <a:pPr marL="0" indent="0">
-              <a:buNone/>
-            </a:pPr>
-            <a:r>
-              <a:rPr lang="en-US" i="1" dirty="0"/>
-              <a:t>Insert Screenshot of Clinical Trial History table</a:t>
-            </a:r>
-            <a:endParaRPr lang="en-US" dirty="0"/>
-          </a:p>
-          <a:p>
-            <a:pPr marL="0" indent="0">
-              <a:buNone/>
-            </a:pPr>
-            <a:endParaRPr lang="en-US" dirty="0"/>
-          </a:p>
-        </p:txBody>
-      </p:sp>
+      <p:pic>
+        <p:nvPicPr>
+          <p:cNvPr id="5" name="Picture 4"/>
+          <p:cNvPicPr>
+            <a:picLocks noChangeAspect="1"/>
+          </p:cNvPicPr>
+          <p:nvPr/>
+        </p:nvPicPr>
+        <p:blipFill>
+          <a:blip r:embed="rId2">
+            <a:extLst>
+              <a:ext uri="{28A0092B-C50C-407E-A947-70E740481C1C}">
+                <a14:useLocalDpi xmlns:a14="http://schemas.microsoft.com/office/drawing/2010/main" val="0"/>
+              </a:ext>
+            </a:extLst>
+          </a:blip>
+          <a:stretch>
+            <a:fillRect/>
+          </a:stretch>
+        </p:blipFill>
+        <p:spPr>
+          <a:xfrm>
+            <a:off x="2418894" y="1539720"/>
+            <a:ext cx="9259747" cy="4934917"/>
+          </a:xfrm>
+          <a:prstGeom prst="rect">
+            <a:avLst/>
+          </a:prstGeom>
+        </p:spPr>
+      </p:pic>
     </p:spTree>
     <p:extLst>
       <p:ext uri="{BB962C8B-B14F-4D97-AF65-F5344CB8AC3E}">
@@ -8754,28 +8765,36 @@
           </a:p>
         </p:txBody>
       </p:sp>
-      <p:sp>
-        <p:nvSpPr>
-          <p:cNvPr id="3" name="Content Placeholder 2"/>
-          <p:cNvSpPr>
-            <a:spLocks noGrp="1"/>
-          </p:cNvSpPr>
-          <p:nvPr>
-            <p:ph idx="1"/>
-          </p:nvPr>
-        </p:nvSpPr>
-        <p:spPr/>
-        <p:txBody>
-          <a:bodyPr/>
-          <a:lstStyle/>
-          <a:p>
-            <a:r>
-              <a:rPr lang="en-US" i="1" dirty="0"/>
-              <a:t>Insert screenshot</a:t>
-            </a:r>
-          </a:p>
-        </p:txBody>
-      </p:sp>
+      <p:pic>
+        <p:nvPicPr>
+          <p:cNvPr id="5" name="Picture 4"/>
+          <p:cNvPicPr>
+            <a:picLocks noChangeAspect="1"/>
+          </p:cNvPicPr>
+          <p:nvPr/>
+        </p:nvPicPr>
+        <p:blipFill>
+          <a:blip r:embed="rId2">
+            <a:extLst>
+              <a:ext uri="{28A0092B-C50C-407E-A947-70E740481C1C}">
+                <a14:useLocalDpi xmlns:a14="http://schemas.microsoft.com/office/drawing/2010/main" val="0"/>
+              </a:ext>
+            </a:extLst>
+          </a:blip>
+          <a:stretch>
+            <a:fillRect/>
+          </a:stretch>
+        </p:blipFill>
+        <p:spPr>
+          <a:xfrm>
+            <a:off x="2450610" y="1458410"/>
+            <a:ext cx="9196315" cy="4907843"/>
+          </a:xfrm>
+          <a:prstGeom prst="rect">
+            <a:avLst/>
+          </a:prstGeom>
+        </p:spPr>
+      </p:pic>
     </p:spTree>
     <p:extLst>
       <p:ext uri="{BB962C8B-B14F-4D97-AF65-F5344CB8AC3E}">

</xml_diff>